<commit_message>
Updates web screen shots
</commit_message>
<xml_diff>
--- a/Raspberry Pi Home Monitoring.pptx
+++ b/Raspberry Pi Home Monitoring.pptx
@@ -14,6 +14,7 @@
     <p:sldId id="263" r:id="rId8"/>
     <p:sldId id="259" r:id="rId9"/>
     <p:sldId id="264" r:id="rId10"/>
+    <p:sldId id="267" r:id="rId11"/>
   </p:sldIdLst>
   <p:sldSz cx="12192000" cy="6858000"/>
   <p:notesSz cx="6858000" cy="9144000"/>
@@ -3092,6 +3093,156 @@
 </p:sld>
 </file>
 
+<file path=ppt/slides/slide10.xml><?xml version="1.0" encoding="utf-8"?>
+<p:sld xmlns:a="http://schemas.openxmlformats.org/drawingml/2006/main" xmlns:r="http://schemas.openxmlformats.org/officeDocument/2006/relationships" xmlns:p="http://schemas.openxmlformats.org/presentationml/2006/main">
+  <p:cSld>
+    <p:spTree>
+      <p:nvGrpSpPr>
+        <p:cNvPr id="1" name=""/>
+        <p:cNvGrpSpPr/>
+        <p:nvPr/>
+      </p:nvGrpSpPr>
+      <p:grpSpPr>
+        <a:xfrm>
+          <a:off x="0" y="0"/>
+          <a:ext cx="0" cy="0"/>
+          <a:chOff x="0" y="0"/>
+          <a:chExt cx="0" cy="0"/>
+        </a:xfrm>
+      </p:grpSpPr>
+      <p:sp>
+        <p:nvSpPr>
+          <p:cNvPr id="2" name="Title 1"/>
+          <p:cNvSpPr>
+            <a:spLocks noGrp="1"/>
+          </p:cNvSpPr>
+          <p:nvPr>
+            <p:ph type="title"/>
+          </p:nvPr>
+        </p:nvSpPr>
+        <p:spPr/>
+        <p:txBody>
+          <a:bodyPr/>
+          <a:lstStyle/>
+          <a:p>
+            <a:r>
+              <a:rPr lang="en-GB" dirty="0" smtClean="0"/>
+              <a:t>Information Page on Website</a:t>
+            </a:r>
+            <a:endParaRPr lang="en-GB" dirty="0"/>
+          </a:p>
+        </p:txBody>
+      </p:sp>
+      <p:pic>
+        <p:nvPicPr>
+          <p:cNvPr id="4" name="Picture 3" descr="Screen Clipping"/>
+          <p:cNvPicPr>
+            <a:picLocks noChangeAspect="1"/>
+          </p:cNvPicPr>
+          <p:nvPr/>
+        </p:nvPicPr>
+        <p:blipFill>
+          <a:blip r:embed="rId2">
+            <a:extLst>
+              <a:ext uri="{28A0092B-C50C-407E-A947-70E740481C1C}">
+                <a14:useLocalDpi xmlns:a14="http://schemas.microsoft.com/office/drawing/2010/main" val="0"/>
+              </a:ext>
+            </a:extLst>
+          </a:blip>
+          <a:stretch>
+            <a:fillRect/>
+          </a:stretch>
+        </p:blipFill>
+        <p:spPr>
+          <a:xfrm>
+            <a:off x="708861" y="1674049"/>
+            <a:ext cx="7821186" cy="4522595"/>
+          </a:xfrm>
+          <a:prstGeom prst="rect">
+            <a:avLst/>
+          </a:prstGeom>
+        </p:spPr>
+      </p:pic>
+      <p:sp>
+        <p:nvSpPr>
+          <p:cNvPr id="5" name="TextBox 4"/>
+          <p:cNvSpPr txBox="1"/>
+          <p:nvPr/>
+        </p:nvSpPr>
+        <p:spPr>
+          <a:xfrm>
+            <a:off x="8869680" y="1690688"/>
+            <a:ext cx="2795451" cy="3416320"/>
+          </a:xfrm>
+          <a:prstGeom prst="rect">
+            <a:avLst/>
+          </a:prstGeom>
+          <a:noFill/>
+        </p:spPr>
+        <p:txBody>
+          <a:bodyPr wrap="square" rtlCol="0">
+            <a:spAutoFit/>
+          </a:bodyPr>
+          <a:lstStyle/>
+          <a:p>
+            <a:pPr marL="285750" indent="-285750">
+              <a:buFont typeface="Arial" panose="020B0604020202020204" pitchFamily="34" charset="0"/>
+              <a:buChar char="•"/>
+            </a:pPr>
+            <a:r>
+              <a:rPr lang="en-GB" dirty="0" smtClean="0"/>
+              <a:t>A Project Overview tab gives the high level objectives of the project</a:t>
+            </a:r>
+          </a:p>
+          <a:p>
+            <a:endParaRPr lang="en-GB" dirty="0" smtClean="0"/>
+          </a:p>
+          <a:p>
+            <a:pPr marL="285750" indent="-285750">
+              <a:buFont typeface="Arial" panose="020B0604020202020204" pitchFamily="34" charset="0"/>
+              <a:buChar char="•"/>
+            </a:pPr>
+            <a:r>
+              <a:rPr lang="en-GB" dirty="0" smtClean="0"/>
+              <a:t>It also has a link to the PowerPoint presentation about the project.</a:t>
+            </a:r>
+          </a:p>
+          <a:p>
+            <a:endParaRPr lang="en-GB" dirty="0" smtClean="0"/>
+          </a:p>
+          <a:p>
+            <a:pPr marL="285750" indent="-285750">
+              <a:buFont typeface="Arial" panose="020B0604020202020204" pitchFamily="34" charset="0"/>
+              <a:buChar char="•"/>
+            </a:pPr>
+            <a:r>
+              <a:rPr lang="en-GB" dirty="0" smtClean="0"/>
+              <a:t>And finally has an overview diagram of how the smart home hub system is set up </a:t>
+            </a:r>
+            <a:endParaRPr lang="en-GB" dirty="0"/>
+          </a:p>
+        </p:txBody>
+      </p:sp>
+    </p:spTree>
+    <p:extLst>
+      <p:ext uri="{BB962C8B-B14F-4D97-AF65-F5344CB8AC3E}">
+        <p14:creationId xmlns:p14="http://schemas.microsoft.com/office/powerpoint/2010/main" val="631833347"/>
+      </p:ext>
+    </p:extLst>
+  </p:cSld>
+  <p:clrMapOvr>
+    <a:masterClrMapping/>
+  </p:clrMapOvr>
+  <p:timing>
+    <p:tnLst>
+      <p:par>
+        <p:cTn id="1" dur="indefinite" restart="never" nodeType="tmRoot"/>
+      </p:par>
+    </p:tnLst>
+  </p:timing>
+</p:sld>
+</file>
+
 <file path=ppt/slides/slide2.xml><?xml version="1.0" encoding="utf-8"?>
 <p:sld xmlns:a="http://schemas.openxmlformats.org/drawingml/2006/main" xmlns:r="http://schemas.openxmlformats.org/officeDocument/2006/relationships" xmlns:p="http://schemas.openxmlformats.org/presentationml/2006/main">
   <p:cSld>
@@ -3238,15 +3389,7 @@
             <a:pPr lvl="1"/>
             <a:r>
               <a:rPr lang="en-GB" dirty="0" smtClean="0"/>
-              <a:t>A tweet will be send to alert the user which will have a link to the last </a:t>
-            </a:r>
-            <a:r>
-              <a:rPr lang="en-GB" dirty="0" smtClean="0"/>
-              <a:t>video </a:t>
-            </a:r>
-            <a:r>
-              <a:rPr lang="en-GB" dirty="0" smtClean="0"/>
-              <a:t>taken.</a:t>
+              <a:t>A tweet will be send to alert the user which will have a link to the last video taken.</a:t>
             </a:r>
             <a:endParaRPr lang="en-GB" dirty="0"/>
           </a:p>
@@ -4607,15 +4750,7 @@
             </a:pPr>
             <a:r>
               <a:rPr lang="en-GB" dirty="0" smtClean="0"/>
-              <a:t>Determine if the Child and Adult tiles are within </a:t>
-            </a:r>
-            <a:r>
-              <a:rPr lang="en-GB" dirty="0" smtClean="0"/>
-              <a:t>the room </a:t>
-            </a:r>
-            <a:r>
-              <a:rPr lang="en-GB" dirty="0" smtClean="0"/>
-              <a:t>range using RSSI.</a:t>
+              <a:t>Determine if the Child and Adult tiles are within the room range using RSSI.</a:t>
             </a:r>
           </a:p>
           <a:p>
@@ -5271,9 +5406,94 @@
           </a:p>
         </p:txBody>
       </p:sp>
+      <p:sp>
+        <p:nvSpPr>
+          <p:cNvPr id="6" name="TextBox 5"/>
+          <p:cNvSpPr txBox="1"/>
+          <p:nvPr/>
+        </p:nvSpPr>
+        <p:spPr>
+          <a:xfrm>
+            <a:off x="5656217" y="1526798"/>
+            <a:ext cx="5697583" cy="2862322"/>
+          </a:xfrm>
+          <a:prstGeom prst="rect">
+            <a:avLst/>
+          </a:prstGeom>
+          <a:noFill/>
+        </p:spPr>
+        <p:txBody>
+          <a:bodyPr wrap="square" rtlCol="0">
+            <a:spAutoFit/>
+          </a:bodyPr>
+          <a:lstStyle/>
+          <a:p>
+            <a:pPr marL="285750" indent="-285750">
+              <a:buFont typeface="Arial" panose="020B0604020202020204" pitchFamily="34" charset="0"/>
+              <a:buChar char="•"/>
+            </a:pPr>
+            <a:r>
+              <a:rPr lang="en-GB" dirty="0" smtClean="0"/>
+              <a:t>A website built in Node.js and using JavaScript and JSON. It uses the handlebars template engine.</a:t>
+            </a:r>
+          </a:p>
+          <a:p>
+            <a:pPr marL="285750" indent="-285750">
+              <a:buFont typeface="Arial" panose="020B0604020202020204" pitchFamily="34" charset="0"/>
+              <a:buChar char="•"/>
+            </a:pPr>
+            <a:endParaRPr lang="en-GB" dirty="0"/>
+          </a:p>
+          <a:p>
+            <a:pPr marL="285750" indent="-285750">
+              <a:buFont typeface="Arial" panose="020B0604020202020204" pitchFamily="34" charset="0"/>
+              <a:buChar char="•"/>
+            </a:pPr>
+            <a:r>
+              <a:rPr lang="en-GB" dirty="0" smtClean="0"/>
+              <a:t>Functionality has been built to allow a user to register for the website and only then a user can log-in.</a:t>
+            </a:r>
+          </a:p>
+          <a:p>
+            <a:pPr marL="285750" indent="-285750">
+              <a:buFont typeface="Arial" panose="020B0604020202020204" pitchFamily="34" charset="0"/>
+              <a:buChar char="•"/>
+            </a:pPr>
+            <a:endParaRPr lang="en-GB" dirty="0"/>
+          </a:p>
+          <a:p>
+            <a:pPr marL="285750" indent="-285750">
+              <a:buFont typeface="Arial" panose="020B0604020202020204" pitchFamily="34" charset="0"/>
+              <a:buChar char="•"/>
+            </a:pPr>
+            <a:r>
+              <a:rPr lang="en-GB" dirty="0" smtClean="0"/>
+              <a:t>Only authenticated users can login and view the last video taken and the dashboard data.</a:t>
+            </a:r>
+          </a:p>
+          <a:p>
+            <a:pPr marL="285750" indent="-285750">
+              <a:buFont typeface="Arial" panose="020B0604020202020204" pitchFamily="34" charset="0"/>
+              <a:buChar char="•"/>
+            </a:pPr>
+            <a:endParaRPr lang="en-GB" dirty="0"/>
+          </a:p>
+          <a:p>
+            <a:pPr marL="285750" indent="-285750">
+              <a:buFont typeface="Arial" panose="020B0604020202020204" pitchFamily="34" charset="0"/>
+              <a:buChar char="•"/>
+            </a:pPr>
+            <a:r>
+              <a:rPr lang="en-GB" dirty="0" smtClean="0"/>
+              <a:t>JSON files are used to store the user information</a:t>
+            </a:r>
+            <a:endParaRPr lang="en-GB" dirty="0"/>
+          </a:p>
+        </p:txBody>
+      </p:sp>
       <p:pic>
         <p:nvPicPr>
-          <p:cNvPr id="5" name="Picture 4" descr="Screen Clipping"/>
+          <p:cNvPr id="8" name="Picture 7" descr="Screen Clipping"/>
           <p:cNvPicPr>
             <a:picLocks noChangeAspect="1"/>
           </p:cNvPicPr>
@@ -5293,102 +5513,17 @@
         </p:blipFill>
         <p:spPr>
           <a:xfrm>
-            <a:off x="838199" y="1690688"/>
-            <a:ext cx="4228255" cy="2358567"/>
+            <a:off x="6014968" y="4389120"/>
+            <a:ext cx="4206962" cy="2408765"/>
           </a:xfrm>
           <a:prstGeom prst="rect">
             <a:avLst/>
           </a:prstGeom>
         </p:spPr>
       </p:pic>
-      <p:sp>
-        <p:nvSpPr>
-          <p:cNvPr id="6" name="TextBox 5"/>
-          <p:cNvSpPr txBox="1"/>
-          <p:nvPr/>
-        </p:nvSpPr>
-        <p:spPr>
-          <a:xfrm>
-            <a:off x="5656217" y="1526798"/>
-            <a:ext cx="5697583" cy="2862322"/>
-          </a:xfrm>
-          <a:prstGeom prst="rect">
-            <a:avLst/>
-          </a:prstGeom>
-          <a:noFill/>
-        </p:spPr>
-        <p:txBody>
-          <a:bodyPr wrap="square" rtlCol="0">
-            <a:spAutoFit/>
-          </a:bodyPr>
-          <a:lstStyle/>
-          <a:p>
-            <a:pPr marL="285750" indent="-285750">
-              <a:buFont typeface="Arial" panose="020B0604020202020204" pitchFamily="34" charset="0"/>
-              <a:buChar char="•"/>
-            </a:pPr>
-            <a:r>
-              <a:rPr lang="en-GB" dirty="0" smtClean="0"/>
-              <a:t>A website built in Node.js and using JavaScript and JSON. It uses the handlebars template engine.</a:t>
-            </a:r>
-          </a:p>
-          <a:p>
-            <a:pPr marL="285750" indent="-285750">
-              <a:buFont typeface="Arial" panose="020B0604020202020204" pitchFamily="34" charset="0"/>
-              <a:buChar char="•"/>
-            </a:pPr>
-            <a:endParaRPr lang="en-GB" dirty="0"/>
-          </a:p>
-          <a:p>
-            <a:pPr marL="285750" indent="-285750">
-              <a:buFont typeface="Arial" panose="020B0604020202020204" pitchFamily="34" charset="0"/>
-              <a:buChar char="•"/>
-            </a:pPr>
-            <a:r>
-              <a:rPr lang="en-GB" dirty="0" smtClean="0"/>
-              <a:t>Functionality has been built to allow a user to register for the website and only then a user can log-in.</a:t>
-            </a:r>
-          </a:p>
-          <a:p>
-            <a:pPr marL="285750" indent="-285750">
-              <a:buFont typeface="Arial" panose="020B0604020202020204" pitchFamily="34" charset="0"/>
-              <a:buChar char="•"/>
-            </a:pPr>
-            <a:endParaRPr lang="en-GB" dirty="0"/>
-          </a:p>
-          <a:p>
-            <a:pPr marL="285750" indent="-285750">
-              <a:buFont typeface="Arial" panose="020B0604020202020204" pitchFamily="34" charset="0"/>
-              <a:buChar char="•"/>
-            </a:pPr>
-            <a:r>
-              <a:rPr lang="en-GB" dirty="0" smtClean="0"/>
-              <a:t>Only authenticated users can login and view the last video taken and the dashboard data.</a:t>
-            </a:r>
-          </a:p>
-          <a:p>
-            <a:pPr marL="285750" indent="-285750">
-              <a:buFont typeface="Arial" panose="020B0604020202020204" pitchFamily="34" charset="0"/>
-              <a:buChar char="•"/>
-            </a:pPr>
-            <a:endParaRPr lang="en-GB" dirty="0"/>
-          </a:p>
-          <a:p>
-            <a:pPr marL="285750" indent="-285750">
-              <a:buFont typeface="Arial" panose="020B0604020202020204" pitchFamily="34" charset="0"/>
-              <a:buChar char="•"/>
-            </a:pPr>
-            <a:r>
-              <a:rPr lang="en-GB" dirty="0" smtClean="0"/>
-              <a:t>JSON files are used to store the user information</a:t>
-            </a:r>
-            <a:endParaRPr lang="en-GB" dirty="0"/>
-          </a:p>
-        </p:txBody>
-      </p:sp>
       <p:pic>
         <p:nvPicPr>
-          <p:cNvPr id="7" name="Picture 6" descr="Screen Clipping"/>
+          <p:cNvPr id="3" name="Picture 2" descr="Screen Clipping"/>
           <p:cNvPicPr>
             <a:picLocks noChangeAspect="1"/>
           </p:cNvPicPr>
@@ -5408,8 +5543,8 @@
         </p:blipFill>
         <p:spPr>
           <a:xfrm>
-            <a:off x="862813" y="4389120"/>
-            <a:ext cx="4203641" cy="2338252"/>
+            <a:off x="431046" y="1690689"/>
+            <a:ext cx="4552988" cy="2436811"/>
           </a:xfrm>
           <a:prstGeom prst="rect">
             <a:avLst/>
@@ -5418,7 +5553,7 @@
       </p:pic>
       <p:pic>
         <p:nvPicPr>
-          <p:cNvPr id="8" name="Picture 7" descr="Screen Clipping"/>
+          <p:cNvPr id="4" name="Picture 3" descr="Screen Clipping"/>
           <p:cNvPicPr>
             <a:picLocks noChangeAspect="1"/>
           </p:cNvPicPr>
@@ -5438,8 +5573,8 @@
         </p:blipFill>
         <p:spPr>
           <a:xfrm>
-            <a:off x="6014968" y="4389120"/>
-            <a:ext cx="4226312" cy="2419844"/>
+            <a:off x="431046" y="4389120"/>
+            <a:ext cx="4548999" cy="2408765"/>
           </a:xfrm>
           <a:prstGeom prst="rect">
             <a:avLst/>
@@ -5528,8 +5663,8 @@
         </p:blipFill>
         <p:spPr>
           <a:xfrm>
-            <a:off x="838199" y="1489164"/>
-            <a:ext cx="6163491" cy="3879669"/>
+            <a:off x="838200" y="1489164"/>
+            <a:ext cx="6246504" cy="3931922"/>
           </a:xfrm>
           <a:prstGeom prst="rect">
             <a:avLst/>
@@ -5564,21 +5699,8 @@
             </a:pPr>
             <a:r>
               <a:rPr lang="en-GB" dirty="0" smtClean="0"/>
-              <a:t>Data is retrieved for the Dashboard from Thingspeak using a API </a:t>
-            </a:r>
-            <a:r>
-              <a:rPr lang="en-GB" dirty="0" smtClean="0"/>
-              <a:t>call retrieving data </a:t>
-            </a:r>
-            <a:r>
-              <a:rPr lang="en-GB" dirty="0" smtClean="0"/>
-              <a:t>into a JSON object. This data is passed down to the handlebars view from the Dashboard controller. This data </a:t>
-            </a:r>
-            <a:r>
-              <a:rPr lang="en-GB" dirty="0" smtClean="0"/>
-              <a:t>includes:</a:t>
-            </a:r>
-            <a:endParaRPr lang="en-GB" dirty="0" smtClean="0"/>
+              <a:t>Data is retrieved for the Dashboard from Thingspeak using a API call retrieving data into a JSON object. This data is passed down to the handlebars view from the Dashboard controller. This data includes:</a:t>
+            </a:r>
           </a:p>
           <a:p>
             <a:pPr marL="742950" lvl="1" indent="-285750">

</xml_diff>

<commit_message>
Final updates to pptx
</commit_message>
<xml_diff>
--- a/Raspberry Pi Home Monitoring.pptx
+++ b/Raspberry Pi Home Monitoring.pptx
@@ -15,6 +15,7 @@
     <p:sldId id="259" r:id="rId9"/>
     <p:sldId id="264" r:id="rId10"/>
     <p:sldId id="267" r:id="rId11"/>
+    <p:sldId id="268" r:id="rId12"/>
   </p:sldIdLst>
   <p:sldSz cx="12192000" cy="6858000"/>
   <p:notesSz cx="6858000" cy="9144000"/>
@@ -3243,6 +3244,173 @@
 </p:sld>
 </file>
 
+<file path=ppt/slides/slide11.xml><?xml version="1.0" encoding="utf-8"?>
+<p:sld xmlns:a="http://schemas.openxmlformats.org/drawingml/2006/main" xmlns:r="http://schemas.openxmlformats.org/officeDocument/2006/relationships" xmlns:p="http://schemas.openxmlformats.org/presentationml/2006/main">
+  <p:cSld>
+    <p:spTree>
+      <p:nvGrpSpPr>
+        <p:cNvPr id="1" name=""/>
+        <p:cNvGrpSpPr/>
+        <p:nvPr/>
+      </p:nvGrpSpPr>
+      <p:grpSpPr>
+        <a:xfrm>
+          <a:off x="0" y="0"/>
+          <a:ext cx="0" cy="0"/>
+          <a:chOff x="0" y="0"/>
+          <a:chExt cx="0" cy="0"/>
+        </a:xfrm>
+      </p:grpSpPr>
+      <p:sp>
+        <p:nvSpPr>
+          <p:cNvPr id="2" name="Title 1"/>
+          <p:cNvSpPr>
+            <a:spLocks noGrp="1"/>
+          </p:cNvSpPr>
+          <p:nvPr>
+            <p:ph type="title"/>
+          </p:nvPr>
+        </p:nvSpPr>
+        <p:spPr>
+          <a:xfrm>
+            <a:off x="586118" y="365125"/>
+            <a:ext cx="10767682" cy="1325563"/>
+          </a:xfrm>
+        </p:spPr>
+        <p:txBody>
+          <a:bodyPr/>
+          <a:lstStyle/>
+          <a:p>
+            <a:r>
+              <a:rPr lang="en-GB" dirty="0" smtClean="0"/>
+              <a:t>Appendix A: </a:t>
+            </a:r>
+            <a:br>
+              <a:rPr lang="en-GB" dirty="0" smtClean="0"/>
+            </a:br>
+            <a:r>
+              <a:rPr lang="en-GB" dirty="0" smtClean="0"/>
+              <a:t>Thingspeak Reacts 	     </a:t>
+            </a:r>
+            <a:r>
+              <a:rPr lang="en-GB" dirty="0" err="1" smtClean="0"/>
+              <a:t>ThingHTTP</a:t>
+            </a:r>
+            <a:r>
+              <a:rPr lang="en-GB" dirty="0" smtClean="0"/>
+              <a:t>/</a:t>
+            </a:r>
+            <a:r>
+              <a:rPr lang="en-GB" dirty="0" err="1" smtClean="0"/>
+              <a:t>ThingTweet</a:t>
+            </a:r>
+            <a:endParaRPr lang="en-GB" dirty="0"/>
+          </a:p>
+        </p:txBody>
+      </p:sp>
+      <p:pic>
+        <p:nvPicPr>
+          <p:cNvPr id="4" name="Picture 3" descr="Screen Clipping"/>
+          <p:cNvPicPr>
+            <a:picLocks noChangeAspect="1"/>
+          </p:cNvPicPr>
+          <p:nvPr/>
+        </p:nvPicPr>
+        <p:blipFill>
+          <a:blip r:embed="rId2">
+            <a:extLst>
+              <a:ext uri="{28A0092B-C50C-407E-A947-70E740481C1C}">
+                <a14:useLocalDpi xmlns:a14="http://schemas.microsoft.com/office/drawing/2010/main" val="0"/>
+              </a:ext>
+            </a:extLst>
+          </a:blip>
+          <a:stretch>
+            <a:fillRect/>
+          </a:stretch>
+        </p:blipFill>
+        <p:spPr>
+          <a:xfrm>
+            <a:off x="586118" y="1690688"/>
+            <a:ext cx="5010849" cy="4583593"/>
+          </a:xfrm>
+          <a:prstGeom prst="rect">
+            <a:avLst/>
+          </a:prstGeom>
+        </p:spPr>
+      </p:pic>
+      <p:pic>
+        <p:nvPicPr>
+          <p:cNvPr id="6" name="Picture 5" descr="Screen Clipping"/>
+          <p:cNvPicPr>
+            <a:picLocks noChangeAspect="1"/>
+          </p:cNvPicPr>
+          <p:nvPr/>
+        </p:nvPicPr>
+        <p:blipFill>
+          <a:blip r:embed="rId3">
+            <a:extLst>
+              <a:ext uri="{28A0092B-C50C-407E-A947-70E740481C1C}">
+                <a14:useLocalDpi xmlns:a14="http://schemas.microsoft.com/office/drawing/2010/main" val="0"/>
+              </a:ext>
+            </a:extLst>
+          </a:blip>
+          <a:stretch>
+            <a:fillRect/>
+          </a:stretch>
+        </p:blipFill>
+        <p:spPr>
+          <a:xfrm>
+            <a:off x="5990604" y="2969867"/>
+            <a:ext cx="4991797" cy="3304414"/>
+          </a:xfrm>
+          <a:prstGeom prst="rect">
+            <a:avLst/>
+          </a:prstGeom>
+        </p:spPr>
+      </p:pic>
+      <p:pic>
+        <p:nvPicPr>
+          <p:cNvPr id="7" name="Picture 6" descr="Screen Clipping"/>
+          <p:cNvPicPr>
+            <a:picLocks noChangeAspect="1"/>
+          </p:cNvPicPr>
+          <p:nvPr/>
+        </p:nvPicPr>
+        <p:blipFill>
+          <a:blip r:embed="rId4">
+            <a:extLst>
+              <a:ext uri="{28A0092B-C50C-407E-A947-70E740481C1C}">
+                <a14:useLocalDpi xmlns:a14="http://schemas.microsoft.com/office/drawing/2010/main" val="0"/>
+              </a:ext>
+            </a:extLst>
+          </a:blip>
+          <a:stretch>
+            <a:fillRect/>
+          </a:stretch>
+        </p:blipFill>
+        <p:spPr>
+          <a:xfrm>
+            <a:off x="5990604" y="1644304"/>
+            <a:ext cx="4991798" cy="1347090"/>
+          </a:xfrm>
+          <a:prstGeom prst="rect">
+            <a:avLst/>
+          </a:prstGeom>
+        </p:spPr>
+      </p:pic>
+    </p:spTree>
+    <p:extLst>
+      <p:ext uri="{BB962C8B-B14F-4D97-AF65-F5344CB8AC3E}">
+        <p14:creationId xmlns:p14="http://schemas.microsoft.com/office/powerpoint/2010/main" val="1104415540"/>
+      </p:ext>
+    </p:extLst>
+  </p:cSld>
+  <p:clrMapOvr>
+    <a:masterClrMapping/>
+  </p:clrMapOvr>
+</p:sld>
+</file>
+
 <file path=ppt/slides/slide2.xml><?xml version="1.0" encoding="utf-8"?>
 <p:sld xmlns:a="http://schemas.openxmlformats.org/drawingml/2006/main" xmlns:r="http://schemas.openxmlformats.org/officeDocument/2006/relationships" xmlns:p="http://schemas.openxmlformats.org/presentationml/2006/main">
   <p:cSld>
@@ -3319,7 +3487,7 @@
             </a:r>
             <a:r>
               <a:rPr lang="en-GB" dirty="0" smtClean="0"/>
-              <a:t>performs </a:t>
+              <a:t>perform </a:t>
             </a:r>
             <a:r>
               <a:rPr lang="en-GB" dirty="0"/>

</xml_diff>